<commit_message>
uprava Timepix 2 casti
</commit_message>
<xml_diff>
--- a/Prezentace/diplomka_diagramy.pptx
+++ b/Prezentace/diplomka_diagramy.pptx
@@ -234,7 +234,7 @@
           <a:p>
             <a:fld id="{41378AF8-A6AF-4C6C-B812-CAB409C6A8AE}" type="datetime1">
               <a:rPr lang="cs-CZ" smtClean="0"/>
-              <a:t>15.02.2024</a:t>
+              <a:t>05.03.2024</a:t>
             </a:fld>
             <a:endParaRPr lang="cs-CZ"/>
           </a:p>
@@ -412,7 +412,7 @@
           <a:p>
             <a:fld id="{ECCFEE94-AE36-4720-81AE-89B9CD716B00}" type="datetime1">
               <a:rPr lang="cs-CZ" smtClean="0"/>
-              <a:t>15.02.2024</a:t>
+              <a:t>05.03.2024</a:t>
             </a:fld>
             <a:endParaRPr lang="cs-CZ"/>
           </a:p>
@@ -4651,7 +4651,7 @@
           <a:p>
             <a:r>
               <a:rPr lang="cs-CZ" sz="1400"/>
-              <a:t>PG_3V3</a:t>
+              <a:t>EN_2V5</a:t>
             </a:r>
           </a:p>
         </p:txBody>

</xml_diff>

<commit_message>
kontrola Teorie + Navrh reseni
</commit_message>
<xml_diff>
--- a/Prezentace/diplomka_diagramy.pptx
+++ b/Prezentace/diplomka_diagramy.pptx
@@ -235,7 +235,7 @@
           <a:p>
             <a:fld id="{41378AF8-A6AF-4C6C-B812-CAB409C6A8AE}" type="datetime1">
               <a:rPr lang="cs-CZ" smtClean="0"/>
-              <a:t>18.03.2024</a:t>
+              <a:t>02.04.2024</a:t>
             </a:fld>
             <a:endParaRPr lang="cs-CZ"/>
           </a:p>
@@ -413,7 +413,7 @@
           <a:p>
             <a:fld id="{ECCFEE94-AE36-4720-81AE-89B9CD716B00}" type="datetime1">
               <a:rPr lang="cs-CZ" smtClean="0"/>
-              <a:t>18.03.2024</a:t>
+              <a:t>02.04.2024</a:t>
             </a:fld>
             <a:endParaRPr lang="cs-CZ"/>
           </a:p>
@@ -4488,10 +4488,9 @@
           <a:p>
             <a:pPr algn="ctr"/>
             <a:r>
-              <a:rPr lang="en-US" sz="2000"/>
-              <a:t>Chipboard</a:t>
-            </a:r>
-            <a:endParaRPr lang="cs-CZ" sz="2000"/>
+              <a:rPr lang="cs-CZ" sz="2000"/>
+              <a:t>Deska s Timepix2</a:t>
+            </a:r>
           </a:p>
           <a:p>
             <a:pPr algn="ctr"/>
@@ -4793,7 +4792,7 @@
         </p:nvSpPr>
         <p:spPr>
           <a:xfrm>
-            <a:off x="3583648" y="3470690"/>
+            <a:off x="3475604" y="3470690"/>
             <a:ext cx="2883158" cy="1200329"/>
           </a:xfrm>
           <a:prstGeom prst="rect">
@@ -4863,7 +4862,7 @@
         <p:spPr>
           <a:xfrm>
             <a:off x="3431916" y="1863125"/>
-            <a:ext cx="2883158" cy="923330"/>
+            <a:ext cx="2883158" cy="1200329"/>
           </a:xfrm>
           <a:prstGeom prst="rect">
             <a:avLst/>
@@ -4883,6 +4882,16 @@
             <a:r>
               <a:rPr lang="cs-CZ"/>
               <a:t>Timepix 2</a:t>
+            </a:r>
+          </a:p>
+          <a:p>
+            <a:pPr marL="285750" indent="-285750">
+              <a:buFont typeface="Arial" panose="020B0604020202020204" pitchFamily="34" charset="0"/>
+              <a:buChar char="•"/>
+            </a:pPr>
+            <a:r>
+              <a:rPr lang="cs-CZ"/>
+              <a:t>Napájení</a:t>
             </a:r>
           </a:p>
           <a:p>

</xml_diff>